<commit_message>
API Mais aprimoramentos em whats_msgs.js
</commit_message>
<xml_diff>
--- a/dashboard/src/assets/images/AzulBot/AzulBot.pptx
+++ b/dashboard/src/assets/images/AzulBot/AzulBot.pptx
@@ -273,7 +273,7 @@
           <a:p>
             <a:fld id="{9EC2420C-BABB-4137-86F8-7C5E7D6CD91D}" type="datetimeFigureOut">
               <a:rPr lang="pt-BR" smtClean="0"/>
-              <a:t>08/10/2024</a:t>
+              <a:t>16/10/2024</a:t>
             </a:fld>
             <a:endParaRPr lang="pt-BR"/>
           </a:p>
@@ -471,7 +471,7 @@
           <a:p>
             <a:fld id="{9EC2420C-BABB-4137-86F8-7C5E7D6CD91D}" type="datetimeFigureOut">
               <a:rPr lang="pt-BR" smtClean="0"/>
-              <a:t>08/10/2024</a:t>
+              <a:t>16/10/2024</a:t>
             </a:fld>
             <a:endParaRPr lang="pt-BR"/>
           </a:p>
@@ -679,7 +679,7 @@
           <a:p>
             <a:fld id="{9EC2420C-BABB-4137-86F8-7C5E7D6CD91D}" type="datetimeFigureOut">
               <a:rPr lang="pt-BR" smtClean="0"/>
-              <a:t>08/10/2024</a:t>
+              <a:t>16/10/2024</a:t>
             </a:fld>
             <a:endParaRPr lang="pt-BR"/>
           </a:p>
@@ -877,7 +877,7 @@
           <a:p>
             <a:fld id="{9EC2420C-BABB-4137-86F8-7C5E7D6CD91D}" type="datetimeFigureOut">
               <a:rPr lang="pt-BR" smtClean="0"/>
-              <a:t>08/10/2024</a:t>
+              <a:t>16/10/2024</a:t>
             </a:fld>
             <a:endParaRPr lang="pt-BR"/>
           </a:p>
@@ -1152,7 +1152,7 @@
           <a:p>
             <a:fld id="{9EC2420C-BABB-4137-86F8-7C5E7D6CD91D}" type="datetimeFigureOut">
               <a:rPr lang="pt-BR" smtClean="0"/>
-              <a:t>08/10/2024</a:t>
+              <a:t>16/10/2024</a:t>
             </a:fld>
             <a:endParaRPr lang="pt-BR"/>
           </a:p>
@@ -1417,7 +1417,7 @@
           <a:p>
             <a:fld id="{9EC2420C-BABB-4137-86F8-7C5E7D6CD91D}" type="datetimeFigureOut">
               <a:rPr lang="pt-BR" smtClean="0"/>
-              <a:t>08/10/2024</a:t>
+              <a:t>16/10/2024</a:t>
             </a:fld>
             <a:endParaRPr lang="pt-BR"/>
           </a:p>
@@ -1829,7 +1829,7 @@
           <a:p>
             <a:fld id="{9EC2420C-BABB-4137-86F8-7C5E7D6CD91D}" type="datetimeFigureOut">
               <a:rPr lang="pt-BR" smtClean="0"/>
-              <a:t>08/10/2024</a:t>
+              <a:t>16/10/2024</a:t>
             </a:fld>
             <a:endParaRPr lang="pt-BR"/>
           </a:p>
@@ -1970,7 +1970,7 @@
           <a:p>
             <a:fld id="{9EC2420C-BABB-4137-86F8-7C5E7D6CD91D}" type="datetimeFigureOut">
               <a:rPr lang="pt-BR" smtClean="0"/>
-              <a:t>08/10/2024</a:t>
+              <a:t>16/10/2024</a:t>
             </a:fld>
             <a:endParaRPr lang="pt-BR"/>
           </a:p>
@@ -2083,7 +2083,7 @@
           <a:p>
             <a:fld id="{9EC2420C-BABB-4137-86F8-7C5E7D6CD91D}" type="datetimeFigureOut">
               <a:rPr lang="pt-BR" smtClean="0"/>
-              <a:t>08/10/2024</a:t>
+              <a:t>16/10/2024</a:t>
             </a:fld>
             <a:endParaRPr lang="pt-BR"/>
           </a:p>
@@ -2394,7 +2394,7 @@
           <a:p>
             <a:fld id="{9EC2420C-BABB-4137-86F8-7C5E7D6CD91D}" type="datetimeFigureOut">
               <a:rPr lang="pt-BR" smtClean="0"/>
-              <a:t>08/10/2024</a:t>
+              <a:t>16/10/2024</a:t>
             </a:fld>
             <a:endParaRPr lang="pt-BR"/>
           </a:p>
@@ -2682,7 +2682,7 @@
           <a:p>
             <a:fld id="{9EC2420C-BABB-4137-86F8-7C5E7D6CD91D}" type="datetimeFigureOut">
               <a:rPr lang="pt-BR" smtClean="0"/>
-              <a:t>08/10/2024</a:t>
+              <a:t>16/10/2024</a:t>
             </a:fld>
             <a:endParaRPr lang="pt-BR"/>
           </a:p>
@@ -2923,7 +2923,7 @@
           <a:p>
             <a:fld id="{9EC2420C-BABB-4137-86F8-7C5E7D6CD91D}" type="datetimeFigureOut">
               <a:rPr lang="pt-BR" smtClean="0"/>
-              <a:t>08/10/2024</a:t>
+              <a:t>16/10/2024</a:t>
             </a:fld>
             <a:endParaRPr lang="pt-BR"/>
           </a:p>
@@ -3340,103 +3340,46 @@
           <a:chExt cx="0" cy="0"/>
         </a:xfrm>
       </p:grpSpPr>
-      <p:grpSp>
-        <p:nvGrpSpPr>
-          <p:cNvPr id="6" name="Agrupar 5">
-            <a:extLst>
-              <a:ext uri="{FF2B5EF4-FFF2-40B4-BE49-F238E27FC236}">
-                <a16:creationId xmlns:a16="http://schemas.microsoft.com/office/drawing/2014/main" id="{3F861AC4-896E-AC00-556F-B1862F5F4A84}"/>
-              </a:ext>
-            </a:extLst>
-          </p:cNvPr>
-          <p:cNvGrpSpPr/>
+      <p:sp>
+        <p:nvSpPr>
+          <p:cNvPr id="2" name="CaixaDeTexto 1">
+            <a:extLst>
+              <a:ext uri="{FF2B5EF4-FFF2-40B4-BE49-F238E27FC236}">
+                <a16:creationId xmlns:a16="http://schemas.microsoft.com/office/drawing/2014/main" id="{7B9BCF45-D3E8-34BC-7ED1-EA1C842869EA}"/>
+              </a:ext>
+            </a:extLst>
+          </p:cNvPr>
+          <p:cNvSpPr txBox="1"/>
           <p:nvPr/>
-        </p:nvGrpSpPr>
-        <p:grpSpPr>
+        </p:nvSpPr>
+        <p:spPr>
           <a:xfrm>
             <a:off x="6305550" y="2339186"/>
             <a:ext cx="4490332" cy="2646878"/>
-            <a:chOff x="5837757" y="2526744"/>
-            <a:chExt cx="4490332" cy="2646878"/>
           </a:xfrm>
-        </p:grpSpPr>
-        <p:sp>
-          <p:nvSpPr>
-            <p:cNvPr id="2" name="CaixaDeTexto 1">
-              <a:extLst>
-                <a:ext uri="{FF2B5EF4-FFF2-40B4-BE49-F238E27FC236}">
-                  <a16:creationId xmlns:a16="http://schemas.microsoft.com/office/drawing/2014/main" id="{7B9BCF45-D3E8-34BC-7ED1-EA1C842869EA}"/>
-                </a:ext>
-              </a:extLst>
-            </p:cNvPr>
-            <p:cNvSpPr txBox="1"/>
-            <p:nvPr/>
-          </p:nvSpPr>
-          <p:spPr>
-            <a:xfrm>
-              <a:off x="5837757" y="2526744"/>
-              <a:ext cx="4490332" cy="2646878"/>
-            </a:xfrm>
-            <a:prstGeom prst="rect">
-              <a:avLst/>
-            </a:prstGeom>
-            <a:noFill/>
-          </p:spPr>
-          <p:txBody>
-            <a:bodyPr wrap="none" rtlCol="0">
-              <a:spAutoFit/>
-            </a:bodyPr>
-            <a:lstStyle/>
-            <a:p>
-              <a:r>
-                <a:rPr lang="pt-BR" sz="16600" dirty="0">
-                  <a:solidFill>
-                    <a:srgbClr val="FFAE44"/>
-                  </a:solidFill>
-                  <a:latin typeface="Audiowide" panose="02000503000000020004" pitchFamily="2" charset="0"/>
-                </a:rPr>
-                <a:t>B  t</a:t>
-              </a:r>
-            </a:p>
-          </p:txBody>
-        </p:sp>
-        <p:pic>
-          <p:nvPicPr>
-            <p:cNvPr id="4" name="Imagem 3" descr="Uma imagem contendo luz, escuro, aceso, mesa&#10;&#10;Descrição gerada automaticamente">
-              <a:extLst>
-                <a:ext uri="{FF2B5EF4-FFF2-40B4-BE49-F238E27FC236}">
-                  <a16:creationId xmlns:a16="http://schemas.microsoft.com/office/drawing/2014/main" id="{6B41C622-4C17-53E1-DE7F-25F66884532F}"/>
-                </a:ext>
-              </a:extLst>
-            </p:cNvPr>
-            <p:cNvPicPr>
-              <a:picLocks noChangeAspect="1"/>
-            </p:cNvPicPr>
-            <p:nvPr/>
-          </p:nvPicPr>
-          <p:blipFill>
-            <a:blip r:embed="rId2">
-              <a:extLst>
-                <a:ext uri="{28A0092B-C50C-407E-A947-70E740481C1C}">
-                  <a14:useLocalDpi xmlns:a14="http://schemas.microsoft.com/office/drawing/2010/main" val="0"/>
-                </a:ext>
-              </a:extLst>
-            </a:blip>
-            <a:stretch>
-              <a:fillRect/>
-            </a:stretch>
-          </p:blipFill>
-          <p:spPr>
-            <a:xfrm>
-              <a:off x="7339794" y="2813014"/>
-              <a:ext cx="1905266" cy="1905266"/>
-            </a:xfrm>
-            <a:prstGeom prst="rect">
-              <a:avLst/>
-            </a:prstGeom>
-          </p:spPr>
-        </p:pic>
-      </p:grpSp>
+          <a:prstGeom prst="rect">
+            <a:avLst/>
+          </a:prstGeom>
+          <a:noFill/>
+        </p:spPr>
+        <p:txBody>
+          <a:bodyPr wrap="none" rtlCol="0">
+            <a:spAutoFit/>
+          </a:bodyPr>
+          <a:lstStyle/>
+          <a:p>
+            <a:r>
+              <a:rPr lang="pt-BR" sz="16600" dirty="0">
+                <a:solidFill>
+                  <a:srgbClr val="FFAE44"/>
+                </a:solidFill>
+                <a:latin typeface="Audiowide" panose="02000503000000020004" pitchFamily="2" charset="0"/>
+              </a:rPr>
+              <a:t>B  t</a:t>
+            </a:r>
+          </a:p>
+        </p:txBody>
+      </p:sp>
       <p:pic>
         <p:nvPicPr>
           <p:cNvPr id="5" name="Imagem 4">
@@ -3452,7 +3395,7 @@
           <p:nvPr/>
         </p:nvPicPr>
         <p:blipFill>
-          <a:blip r:embed="rId3"/>
+          <a:blip r:embed="rId2"/>
           <a:stretch>
             <a:fillRect/>
           </a:stretch>
@@ -3482,7 +3425,7 @@
           <p:nvPr/>
         </p:nvPicPr>
         <p:blipFill>
-          <a:blip r:embed="rId4">
+          <a:blip r:embed="rId3">
             <a:extLst>
               <a:ext uri="{28A0092B-C50C-407E-A947-70E740481C1C}">
                 <a14:useLocalDpi xmlns:a14="http://schemas.microsoft.com/office/drawing/2010/main" val="0"/>
@@ -3514,6 +3457,41 @@
           </a:extLst>
         </p:spPr>
       </p:pic>
+      <p:sp>
+        <p:nvSpPr>
+          <p:cNvPr id="3" name="CaixaDeTexto 2">
+            <a:extLst>
+              <a:ext uri="{FF2B5EF4-FFF2-40B4-BE49-F238E27FC236}">
+                <a16:creationId xmlns:a16="http://schemas.microsoft.com/office/drawing/2014/main" id="{FB052661-A9E9-99FD-A27B-1F1EE5305142}"/>
+              </a:ext>
+            </a:extLst>
+          </p:cNvPr>
+          <p:cNvSpPr txBox="1"/>
+          <p:nvPr/>
+        </p:nvSpPr>
+        <p:spPr>
+          <a:xfrm>
+            <a:off x="7534275" y="2419350"/>
+            <a:ext cx="2614818" cy="2215991"/>
+          </a:xfrm>
+          <a:prstGeom prst="rect">
+            <a:avLst/>
+          </a:prstGeom>
+          <a:noFill/>
+        </p:spPr>
+        <p:txBody>
+          <a:bodyPr wrap="none" rtlCol="0">
+            <a:spAutoFit/>
+          </a:bodyPr>
+          <a:lstStyle/>
+          <a:p>
+            <a:r>
+              <a:rPr lang="pt-BR" sz="13800" dirty="0"/>
+              <a:t>🤖</a:t>
+            </a:r>
+          </a:p>
+        </p:txBody>
+      </p:sp>
     </p:spTree>
     <p:extLst>
       <p:ext uri="{BB962C8B-B14F-4D97-AF65-F5344CB8AC3E}">
@@ -3560,14 +3538,13 @@
         </p:nvPicPr>
         <p:blipFill>
           <a:blip r:embed="rId2"/>
-          <a:stretch>
-            <a:fillRect/>
-          </a:stretch>
+          <a:srcRect r="45023"/>
+          <a:stretch/>
         </p:blipFill>
         <p:spPr>
           <a:xfrm>
             <a:off x="2638425" y="2421506"/>
-            <a:ext cx="8420100" cy="1821142"/>
+            <a:ext cx="4629150" cy="1821142"/>
           </a:xfrm>
           <a:prstGeom prst="rect">
             <a:avLst/>
@@ -3621,6 +3598,81 @@
           </a:extLst>
         </p:spPr>
       </p:pic>
+      <p:sp>
+        <p:nvSpPr>
+          <p:cNvPr id="2" name="CaixaDeTexto 1">
+            <a:extLst>
+              <a:ext uri="{FF2B5EF4-FFF2-40B4-BE49-F238E27FC236}">
+                <a16:creationId xmlns:a16="http://schemas.microsoft.com/office/drawing/2014/main" id="{E55D7E29-FDC6-D368-0A67-7C5D5EBC5FD6}"/>
+              </a:ext>
+            </a:extLst>
+          </p:cNvPr>
+          <p:cNvSpPr txBox="1"/>
+          <p:nvPr/>
+        </p:nvSpPr>
+        <p:spPr>
+          <a:xfrm>
+            <a:off x="7105650" y="2215361"/>
+            <a:ext cx="4490332" cy="2646878"/>
+          </a:xfrm>
+          <a:prstGeom prst="rect">
+            <a:avLst/>
+          </a:prstGeom>
+          <a:noFill/>
+        </p:spPr>
+        <p:txBody>
+          <a:bodyPr wrap="none" rtlCol="0">
+            <a:spAutoFit/>
+          </a:bodyPr>
+          <a:lstStyle/>
+          <a:p>
+            <a:r>
+              <a:rPr lang="pt-BR" sz="16600" dirty="0">
+                <a:solidFill>
+                  <a:srgbClr val="FFAE44"/>
+                </a:solidFill>
+                <a:latin typeface="Audiowide" panose="02000503000000020004" pitchFamily="2" charset="0"/>
+              </a:rPr>
+              <a:t>B  t</a:t>
+            </a:r>
+          </a:p>
+        </p:txBody>
+      </p:sp>
+      <p:sp>
+        <p:nvSpPr>
+          <p:cNvPr id="3" name="CaixaDeTexto 2">
+            <a:extLst>
+              <a:ext uri="{FF2B5EF4-FFF2-40B4-BE49-F238E27FC236}">
+                <a16:creationId xmlns:a16="http://schemas.microsoft.com/office/drawing/2014/main" id="{F1F6A2E4-425A-F9C0-46E6-175362AA8D9D}"/>
+              </a:ext>
+            </a:extLst>
+          </p:cNvPr>
+          <p:cNvSpPr txBox="1"/>
+          <p:nvPr/>
+        </p:nvSpPr>
+        <p:spPr>
+          <a:xfrm>
+            <a:off x="8334375" y="2295525"/>
+            <a:ext cx="2614818" cy="2215991"/>
+          </a:xfrm>
+          <a:prstGeom prst="rect">
+            <a:avLst/>
+          </a:prstGeom>
+          <a:noFill/>
+        </p:spPr>
+        <p:txBody>
+          <a:bodyPr wrap="none" rtlCol="0">
+            <a:spAutoFit/>
+          </a:bodyPr>
+          <a:lstStyle/>
+          <a:p>
+            <a:r>
+              <a:rPr lang="pt-BR" sz="13800" dirty="0"/>
+              <a:t>🤖</a:t>
+            </a:r>
+          </a:p>
+        </p:txBody>
+      </p:sp>
     </p:spTree>
     <p:extLst>
       <p:ext uri="{BB962C8B-B14F-4D97-AF65-F5344CB8AC3E}">
@@ -3728,36 +3780,102 @@
           </a:prstGeom>
         </p:spPr>
       </p:pic>
-      <p:pic>
-        <p:nvPicPr>
-          <p:cNvPr id="4" name="Imagem 3">
-            <a:extLst>
-              <a:ext uri="{FF2B5EF4-FFF2-40B4-BE49-F238E27FC236}">
-                <a16:creationId xmlns:a16="http://schemas.microsoft.com/office/drawing/2014/main" id="{1C2D3049-589E-2763-FBD8-ED29B789A04C}"/>
-              </a:ext>
-            </a:extLst>
-          </p:cNvPr>
-          <p:cNvPicPr>
-            <a:picLocks noChangeAspect="1"/>
-          </p:cNvPicPr>
+      <p:grpSp>
+        <p:nvGrpSpPr>
+          <p:cNvPr id="6" name="Agrupar 5">
+            <a:extLst>
+              <a:ext uri="{FF2B5EF4-FFF2-40B4-BE49-F238E27FC236}">
+                <a16:creationId xmlns:a16="http://schemas.microsoft.com/office/drawing/2014/main" id="{EE675E40-015D-249B-AE63-4C314ECA8692}"/>
+              </a:ext>
+            </a:extLst>
+          </p:cNvPr>
+          <p:cNvGrpSpPr/>
           <p:nvPr/>
-        </p:nvPicPr>
-        <p:blipFill>
-          <a:blip r:embed="rId4"/>
-          <a:stretch>
-            <a:fillRect/>
-          </a:stretch>
-        </p:blipFill>
-        <p:spPr>
+        </p:nvGrpSpPr>
+        <p:grpSpPr>
           <a:xfrm>
-            <a:off x="3638550" y="4566911"/>
-            <a:ext cx="4914900" cy="1824694"/>
+            <a:off x="3850834" y="4211122"/>
+            <a:ext cx="4490332" cy="2646878"/>
+            <a:chOff x="3933825" y="4211122"/>
+            <a:chExt cx="4490332" cy="2646878"/>
           </a:xfrm>
-          <a:prstGeom prst="rect">
-            <a:avLst/>
-          </a:prstGeom>
-        </p:spPr>
-      </p:pic>
+        </p:grpSpPr>
+        <p:sp>
+          <p:nvSpPr>
+            <p:cNvPr id="2" name="CaixaDeTexto 1">
+              <a:extLst>
+                <a:ext uri="{FF2B5EF4-FFF2-40B4-BE49-F238E27FC236}">
+                  <a16:creationId xmlns:a16="http://schemas.microsoft.com/office/drawing/2014/main" id="{58F052CF-C45D-3C13-5A36-CC1AE342EFAE}"/>
+                </a:ext>
+              </a:extLst>
+            </p:cNvPr>
+            <p:cNvSpPr txBox="1"/>
+            <p:nvPr/>
+          </p:nvSpPr>
+          <p:spPr>
+            <a:xfrm>
+              <a:off x="3933825" y="4211122"/>
+              <a:ext cx="4490332" cy="2646878"/>
+            </a:xfrm>
+            <a:prstGeom prst="rect">
+              <a:avLst/>
+            </a:prstGeom>
+            <a:noFill/>
+          </p:spPr>
+          <p:txBody>
+            <a:bodyPr wrap="none" rtlCol="0">
+              <a:spAutoFit/>
+            </a:bodyPr>
+            <a:lstStyle/>
+            <a:p>
+              <a:r>
+                <a:rPr lang="pt-BR" sz="16600" dirty="0">
+                  <a:solidFill>
+                    <a:srgbClr val="FFAE44"/>
+                  </a:solidFill>
+                  <a:latin typeface="Audiowide" panose="02000503000000020004" pitchFamily="2" charset="0"/>
+                </a:rPr>
+                <a:t>B  t</a:t>
+              </a:r>
+            </a:p>
+          </p:txBody>
+        </p:sp>
+        <p:sp>
+          <p:nvSpPr>
+            <p:cNvPr id="5" name="CaixaDeTexto 4">
+              <a:extLst>
+                <a:ext uri="{FF2B5EF4-FFF2-40B4-BE49-F238E27FC236}">
+                  <a16:creationId xmlns:a16="http://schemas.microsoft.com/office/drawing/2014/main" id="{6D8E9A1D-A3C6-9F39-427C-11C336FA33B1}"/>
+                </a:ext>
+              </a:extLst>
+            </p:cNvPr>
+            <p:cNvSpPr txBox="1"/>
+            <p:nvPr/>
+          </p:nvSpPr>
+          <p:spPr>
+            <a:xfrm>
+              <a:off x="5162550" y="4291286"/>
+              <a:ext cx="2614818" cy="2215991"/>
+            </a:xfrm>
+            <a:prstGeom prst="rect">
+              <a:avLst/>
+            </a:prstGeom>
+            <a:noFill/>
+          </p:spPr>
+          <p:txBody>
+            <a:bodyPr wrap="none" rtlCol="0">
+              <a:spAutoFit/>
+            </a:bodyPr>
+            <a:lstStyle/>
+            <a:p>
+              <a:r>
+                <a:rPr lang="pt-BR" sz="13800" dirty="0"/>
+                <a:t>🤖</a:t>
+              </a:r>
+            </a:p>
+          </p:txBody>
+        </p:sp>
+      </p:grpSp>
     </p:spTree>
     <p:extLst>
       <p:ext uri="{BB962C8B-B14F-4D97-AF65-F5344CB8AC3E}">
@@ -3818,36 +3936,81 @@
           </a:prstGeom>
         </p:spPr>
       </p:pic>
-      <p:pic>
-        <p:nvPicPr>
-          <p:cNvPr id="5" name="Imagem 4">
-            <a:extLst>
-              <a:ext uri="{FF2B5EF4-FFF2-40B4-BE49-F238E27FC236}">
-                <a16:creationId xmlns:a16="http://schemas.microsoft.com/office/drawing/2014/main" id="{C7CEF31E-2A6C-2B66-ED2C-41147EECEF71}"/>
-              </a:ext>
-            </a:extLst>
-          </p:cNvPr>
-          <p:cNvPicPr>
-            <a:picLocks noChangeAspect="1"/>
-          </p:cNvPicPr>
+      <p:sp>
+        <p:nvSpPr>
+          <p:cNvPr id="2" name="CaixaDeTexto 1">
+            <a:extLst>
+              <a:ext uri="{FF2B5EF4-FFF2-40B4-BE49-F238E27FC236}">
+                <a16:creationId xmlns:a16="http://schemas.microsoft.com/office/drawing/2014/main" id="{ED2BD32A-E20E-7F44-22C5-63EB0DE2EC6D}"/>
+              </a:ext>
+            </a:extLst>
+          </p:cNvPr>
+          <p:cNvSpPr txBox="1"/>
           <p:nvPr/>
-        </p:nvPicPr>
-        <p:blipFill>
-          <a:blip r:embed="rId3"/>
-          <a:stretch>
-            <a:fillRect/>
-          </a:stretch>
-        </p:blipFill>
+        </p:nvSpPr>
         <p:spPr>
           <a:xfrm>
-            <a:off x="3609975" y="3501313"/>
-            <a:ext cx="4972050" cy="1845910"/>
+            <a:off x="3781425" y="3215486"/>
+            <a:ext cx="4490332" cy="2646878"/>
           </a:xfrm>
           <a:prstGeom prst="rect">
             <a:avLst/>
           </a:prstGeom>
+          <a:noFill/>
         </p:spPr>
-      </p:pic>
+        <p:txBody>
+          <a:bodyPr wrap="none" rtlCol="0">
+            <a:spAutoFit/>
+          </a:bodyPr>
+          <a:lstStyle/>
+          <a:p>
+            <a:r>
+              <a:rPr lang="pt-BR" sz="16600" dirty="0">
+                <a:solidFill>
+                  <a:srgbClr val="FFAE44"/>
+                </a:solidFill>
+                <a:latin typeface="Audiowide" panose="02000503000000020004" pitchFamily="2" charset="0"/>
+              </a:rPr>
+              <a:t>B  t</a:t>
+            </a:r>
+          </a:p>
+        </p:txBody>
+      </p:sp>
+      <p:sp>
+        <p:nvSpPr>
+          <p:cNvPr id="4" name="CaixaDeTexto 3">
+            <a:extLst>
+              <a:ext uri="{FF2B5EF4-FFF2-40B4-BE49-F238E27FC236}">
+                <a16:creationId xmlns:a16="http://schemas.microsoft.com/office/drawing/2014/main" id="{34CCE407-0360-714A-34BC-2AE5B9A03841}"/>
+              </a:ext>
+            </a:extLst>
+          </p:cNvPr>
+          <p:cNvSpPr txBox="1"/>
+          <p:nvPr/>
+        </p:nvSpPr>
+        <p:spPr>
+          <a:xfrm>
+            <a:off x="5010150" y="3295650"/>
+            <a:ext cx="2614818" cy="2215991"/>
+          </a:xfrm>
+          <a:prstGeom prst="rect">
+            <a:avLst/>
+          </a:prstGeom>
+          <a:noFill/>
+        </p:spPr>
+        <p:txBody>
+          <a:bodyPr wrap="none" rtlCol="0">
+            <a:spAutoFit/>
+          </a:bodyPr>
+          <a:lstStyle/>
+          <a:p>
+            <a:r>
+              <a:rPr lang="pt-BR" sz="13800" dirty="0"/>
+              <a:t>🤖</a:t>
+            </a:r>
+          </a:p>
+        </p:txBody>
+      </p:sp>
     </p:spTree>
     <p:extLst>
       <p:ext uri="{BB962C8B-B14F-4D97-AF65-F5344CB8AC3E}">

</xml_diff>